<commit_message>
Adding neutron stuff to part 2
</commit_message>
<xml_diff>
--- a/Nuclear Physics Part 2.pptx
+++ b/Nuclear Physics Part 2.pptx
@@ -20,6 +20,12 @@
     <p:sldId id="276" r:id="rId14"/>
     <p:sldId id="264" r:id="rId15"/>
     <p:sldId id="277" r:id="rId16"/>
+    <p:sldId id="278" r:id="rId17"/>
+    <p:sldId id="279" r:id="rId18"/>
+    <p:sldId id="280" r:id="rId19"/>
+    <p:sldId id="281" r:id="rId20"/>
+    <p:sldId id="282" r:id="rId21"/>
+    <p:sldId id="283" r:id="rId22"/>
   </p:sldIdLst>
   <p:sldSz cx="9144000" cy="6858000" type="screen4x3"/>
   <p:notesSz cx="6858000" cy="9144000"/>
@@ -305,7 +311,7 @@
           <a:p>
             <a:fld id="{084320B7-5C19-44D2-9A76-0FFD36439E9F}" type="datetimeFigureOut">
               <a:rPr lang="en-US" smtClean="0"/>
-              <a:t>5/18/2020</a:t>
+              <a:t>5/26/2020</a:t>
             </a:fld>
             <a:endParaRPr lang="en-US"/>
           </a:p>
@@ -473,7 +479,7 @@
           <a:p>
             <a:fld id="{084320B7-5C19-44D2-9A76-0FFD36439E9F}" type="datetimeFigureOut">
               <a:rPr lang="en-US" smtClean="0"/>
-              <a:t>5/18/2020</a:t>
+              <a:t>5/26/2020</a:t>
             </a:fld>
             <a:endParaRPr lang="en-US"/>
           </a:p>
@@ -651,7 +657,7 @@
           <a:p>
             <a:fld id="{084320B7-5C19-44D2-9A76-0FFD36439E9F}" type="datetimeFigureOut">
               <a:rPr lang="en-US" smtClean="0"/>
-              <a:t>5/18/2020</a:t>
+              <a:t>5/26/2020</a:t>
             </a:fld>
             <a:endParaRPr lang="en-US"/>
           </a:p>
@@ -819,7 +825,7 @@
           <a:p>
             <a:fld id="{084320B7-5C19-44D2-9A76-0FFD36439E9F}" type="datetimeFigureOut">
               <a:rPr lang="en-US" smtClean="0"/>
-              <a:t>5/18/2020</a:t>
+              <a:t>5/26/2020</a:t>
             </a:fld>
             <a:endParaRPr lang="en-US"/>
           </a:p>
@@ -1064,7 +1070,7 @@
           <a:p>
             <a:fld id="{084320B7-5C19-44D2-9A76-0FFD36439E9F}" type="datetimeFigureOut">
               <a:rPr lang="en-US" smtClean="0"/>
-              <a:t>5/18/2020</a:t>
+              <a:t>5/26/2020</a:t>
             </a:fld>
             <a:endParaRPr lang="en-US"/>
           </a:p>
@@ -1349,7 +1355,7 @@
           <a:p>
             <a:fld id="{084320B7-5C19-44D2-9A76-0FFD36439E9F}" type="datetimeFigureOut">
               <a:rPr lang="en-US" smtClean="0"/>
-              <a:t>5/18/2020</a:t>
+              <a:t>5/26/2020</a:t>
             </a:fld>
             <a:endParaRPr lang="en-US"/>
           </a:p>
@@ -1768,7 +1774,7 @@
           <a:p>
             <a:fld id="{084320B7-5C19-44D2-9A76-0FFD36439E9F}" type="datetimeFigureOut">
               <a:rPr lang="en-US" smtClean="0"/>
-              <a:t>5/18/2020</a:t>
+              <a:t>5/26/2020</a:t>
             </a:fld>
             <a:endParaRPr lang="en-US"/>
           </a:p>
@@ -1885,7 +1891,7 @@
           <a:p>
             <a:fld id="{084320B7-5C19-44D2-9A76-0FFD36439E9F}" type="datetimeFigureOut">
               <a:rPr lang="en-US" smtClean="0"/>
-              <a:t>5/18/2020</a:t>
+              <a:t>5/26/2020</a:t>
             </a:fld>
             <a:endParaRPr lang="en-US"/>
           </a:p>
@@ -1980,7 +1986,7 @@
           <a:p>
             <a:fld id="{084320B7-5C19-44D2-9A76-0FFD36439E9F}" type="datetimeFigureOut">
               <a:rPr lang="en-US" smtClean="0"/>
-              <a:t>5/18/2020</a:t>
+              <a:t>5/26/2020</a:t>
             </a:fld>
             <a:endParaRPr lang="en-US"/>
           </a:p>
@@ -2255,7 +2261,7 @@
           <a:p>
             <a:fld id="{084320B7-5C19-44D2-9A76-0FFD36439E9F}" type="datetimeFigureOut">
               <a:rPr lang="en-US" smtClean="0"/>
-              <a:t>5/18/2020</a:t>
+              <a:t>5/26/2020</a:t>
             </a:fld>
             <a:endParaRPr lang="en-US"/>
           </a:p>
@@ -2510,7 +2516,7 @@
           <a:p>
             <a:fld id="{084320B7-5C19-44D2-9A76-0FFD36439E9F}" type="datetimeFigureOut">
               <a:rPr lang="en-US" smtClean="0"/>
-              <a:t>5/18/2020</a:t>
+              <a:t>5/26/2020</a:t>
             </a:fld>
             <a:endParaRPr lang="en-US"/>
           </a:p>
@@ -2724,7 +2730,7 @@
           <a:p>
             <a:fld id="{084320B7-5C19-44D2-9A76-0FFD36439E9F}" type="datetimeFigureOut">
               <a:rPr lang="en-US" smtClean="0"/>
-              <a:t>5/18/2020</a:t>
+              <a:t>5/26/2020</a:t>
             </a:fld>
             <a:endParaRPr lang="en-US"/>
           </a:p>
@@ -3248,8 +3254,8 @@
           </a:p>
         </p:txBody>
       </p:sp>
-      <mc:AlternateContent xmlns:mc="http://schemas.openxmlformats.org/markup-compatibility/2006">
-        <mc:Choice xmlns:a14="http://schemas.microsoft.com/office/drawing/2010/main" Requires="a14">
+      <mc:AlternateContent xmlns:mc="http://schemas.openxmlformats.org/markup-compatibility/2006" xmlns:a14="http://schemas.microsoft.com/office/drawing/2010/main">
+        <mc:Choice Requires="a14">
           <p:sp>
             <p:nvSpPr>
               <p:cNvPr id="3" name="Content Placeholder 2">
@@ -3429,13 +3435,7 @@
                           <a:rPr lang="en-US" i="1">
                             <a:latin typeface="Cambria Math" panose="02040503050406030204" pitchFamily="18" charset="0"/>
                           </a:rPr>
-                          <m:t>2</m:t>
-                        </m:r>
-                        <m:r>
-                          <a:rPr lang="en-US" i="1">
-                            <a:latin typeface="Cambria Math" panose="02040503050406030204" pitchFamily="18" charset="0"/>
-                          </a:rPr>
-                          <m:t>8</m:t>
+                          <m:t>28</m:t>
                         </m:r>
                       </m:sub>
                       <m:sup>
@@ -3475,7 +3475,7 @@
             </p:txBody>
           </p:sp>
         </mc:Choice>
-        <mc:Fallback>
+        <mc:Fallback xmlns="">
           <p:sp>
             <p:nvSpPr>
               <p:cNvPr id="3" name="Content Placeholder 2">
@@ -5232,6 +5232,822 @@
 </p:sld>
 </file>
 
+<file path=ppt/slides/slide16.xml><?xml version="1.0" encoding="utf-8"?>
+<p:sld xmlns:a="http://schemas.openxmlformats.org/drawingml/2006/main" xmlns:r="http://schemas.openxmlformats.org/officeDocument/2006/relationships" xmlns:p="http://schemas.openxmlformats.org/presentationml/2006/main">
+  <p:cSld>
+    <p:spTree>
+      <p:nvGrpSpPr>
+        <p:cNvPr id="1" name=""/>
+        <p:cNvGrpSpPr/>
+        <p:nvPr/>
+      </p:nvGrpSpPr>
+      <p:grpSpPr>
+        <a:xfrm>
+          <a:off x="0" y="0"/>
+          <a:ext cx="0" cy="0"/>
+          <a:chOff x="0" y="0"/>
+          <a:chExt cx="0" cy="0"/>
+        </a:xfrm>
+      </p:grpSpPr>
+      <p:sp>
+        <p:nvSpPr>
+          <p:cNvPr id="2" name="Title 1">
+            <a:extLst>
+              <a:ext uri="{FF2B5EF4-FFF2-40B4-BE49-F238E27FC236}">
+                <a16:creationId xmlns:a16="http://schemas.microsoft.com/office/drawing/2014/main" id="{70FDB078-B04C-4D61-A86E-B151FA07F550}"/>
+              </a:ext>
+            </a:extLst>
+          </p:cNvPr>
+          <p:cNvSpPr>
+            <a:spLocks noGrp="1"/>
+          </p:cNvSpPr>
+          <p:nvPr>
+            <p:ph type="title"/>
+          </p:nvPr>
+        </p:nvSpPr>
+        <p:spPr/>
+        <p:txBody>
+          <a:bodyPr/>
+          <a:lstStyle/>
+          <a:p>
+            <a:r>
+              <a:rPr lang="en-US" dirty="0"/>
+              <a:t>Nuclear Reactions</a:t>
+            </a:r>
+          </a:p>
+        </p:txBody>
+      </p:sp>
+      <p:sp>
+        <p:nvSpPr>
+          <p:cNvPr id="3" name="Content Placeholder 2">
+            <a:extLst>
+              <a:ext uri="{FF2B5EF4-FFF2-40B4-BE49-F238E27FC236}">
+                <a16:creationId xmlns:a16="http://schemas.microsoft.com/office/drawing/2014/main" id="{8621708C-D01F-449C-9013-A8118C670E05}"/>
+              </a:ext>
+            </a:extLst>
+          </p:cNvPr>
+          <p:cNvSpPr>
+            <a:spLocks noGrp="1"/>
+          </p:cNvSpPr>
+          <p:nvPr>
+            <p:ph idx="1"/>
+          </p:nvPr>
+        </p:nvSpPr>
+        <p:spPr/>
+        <p:txBody>
+          <a:bodyPr/>
+          <a:lstStyle/>
+          <a:p>
+            <a:r>
+              <a:rPr lang="en-US" dirty="0"/>
+              <a:t>So far, we’ve talked about </a:t>
+            </a:r>
+            <a:r>
+              <a:rPr lang="en-US" i="1" dirty="0"/>
+              <a:t>radioactive decay</a:t>
+            </a:r>
+          </a:p>
+          <a:p>
+            <a:pPr lvl="1"/>
+            <a:r>
+              <a:rPr lang="en-US" dirty="0"/>
+              <a:t>Some isotopes are unstable, and will decay to other isotopes with a certain probability (the half-life)</a:t>
+            </a:r>
+          </a:p>
+          <a:p>
+            <a:pPr lvl="1"/>
+            <a:r>
+              <a:rPr lang="en-US" dirty="0"/>
+              <a:t>There’s not much that can be done about this</a:t>
+            </a:r>
+          </a:p>
+          <a:p>
+            <a:endParaRPr lang="en-US" dirty="0"/>
+          </a:p>
+        </p:txBody>
+      </p:sp>
+    </p:spTree>
+    <p:extLst>
+      <p:ext uri="{BB962C8B-B14F-4D97-AF65-F5344CB8AC3E}">
+        <p14:creationId xmlns:p14="http://schemas.microsoft.com/office/powerpoint/2010/main" val="957366168"/>
+      </p:ext>
+    </p:extLst>
+  </p:cSld>
+  <p:clrMapOvr>
+    <a:masterClrMapping/>
+  </p:clrMapOvr>
+</p:sld>
+</file>
+
+<file path=ppt/slides/slide17.xml><?xml version="1.0" encoding="utf-8"?>
+<p:sld xmlns:a="http://schemas.openxmlformats.org/drawingml/2006/main" xmlns:r="http://schemas.openxmlformats.org/officeDocument/2006/relationships" xmlns:p="http://schemas.openxmlformats.org/presentationml/2006/main">
+  <p:cSld>
+    <p:spTree>
+      <p:nvGrpSpPr>
+        <p:cNvPr id="1" name=""/>
+        <p:cNvGrpSpPr/>
+        <p:nvPr/>
+      </p:nvGrpSpPr>
+      <p:grpSpPr>
+        <a:xfrm>
+          <a:off x="0" y="0"/>
+          <a:ext cx="0" cy="0"/>
+          <a:chOff x="0" y="0"/>
+          <a:chExt cx="0" cy="0"/>
+        </a:xfrm>
+      </p:grpSpPr>
+      <p:sp>
+        <p:nvSpPr>
+          <p:cNvPr id="2" name="Title 1">
+            <a:extLst>
+              <a:ext uri="{FF2B5EF4-FFF2-40B4-BE49-F238E27FC236}">
+                <a16:creationId xmlns:a16="http://schemas.microsoft.com/office/drawing/2014/main" id="{CD03AA3C-AF75-437C-B8D7-267E954C5A0E}"/>
+              </a:ext>
+            </a:extLst>
+          </p:cNvPr>
+          <p:cNvSpPr>
+            <a:spLocks noGrp="1"/>
+          </p:cNvSpPr>
+          <p:nvPr>
+            <p:ph type="title"/>
+          </p:nvPr>
+        </p:nvSpPr>
+        <p:spPr/>
+        <p:txBody>
+          <a:bodyPr/>
+          <a:lstStyle/>
+          <a:p>
+            <a:r>
+              <a:rPr lang="en-US" dirty="0"/>
+              <a:t>Nuclear Reactions</a:t>
+            </a:r>
+          </a:p>
+        </p:txBody>
+      </p:sp>
+      <p:sp>
+        <p:nvSpPr>
+          <p:cNvPr id="3" name="Content Placeholder 2">
+            <a:extLst>
+              <a:ext uri="{FF2B5EF4-FFF2-40B4-BE49-F238E27FC236}">
+                <a16:creationId xmlns:a16="http://schemas.microsoft.com/office/drawing/2014/main" id="{EF573AB7-C559-44BD-9BE7-F3D77497CFD0}"/>
+              </a:ext>
+            </a:extLst>
+          </p:cNvPr>
+          <p:cNvSpPr>
+            <a:spLocks noGrp="1"/>
+          </p:cNvSpPr>
+          <p:nvPr>
+            <p:ph idx="1"/>
+          </p:nvPr>
+        </p:nvSpPr>
+        <p:spPr/>
+        <p:txBody>
+          <a:bodyPr/>
+          <a:lstStyle/>
+          <a:p>
+            <a:r>
+              <a:rPr lang="en-US" b="1" dirty="0"/>
+              <a:t>How can we </a:t>
+            </a:r>
+            <a:r>
+              <a:rPr lang="en-US" b="1" i="1" dirty="0"/>
+              <a:t>cause</a:t>
+            </a:r>
+            <a:r>
+              <a:rPr lang="en-US" b="1" dirty="0"/>
+              <a:t> changes to atoms?</a:t>
+            </a:r>
+            <a:endParaRPr lang="en-US" dirty="0"/>
+          </a:p>
+          <a:p>
+            <a:r>
+              <a:rPr lang="en-US" dirty="0"/>
+              <a:t>The main way to intentionally modify atoms starts with adding one or more neutrons.</a:t>
+            </a:r>
+          </a:p>
+        </p:txBody>
+      </p:sp>
+    </p:spTree>
+    <p:extLst>
+      <p:ext uri="{BB962C8B-B14F-4D97-AF65-F5344CB8AC3E}">
+        <p14:creationId xmlns:p14="http://schemas.microsoft.com/office/powerpoint/2010/main" val="3018235917"/>
+      </p:ext>
+    </p:extLst>
+  </p:cSld>
+  <p:clrMapOvr>
+    <a:masterClrMapping/>
+  </p:clrMapOvr>
+</p:sld>
+</file>
+
+<file path=ppt/slides/slide18.xml><?xml version="1.0" encoding="utf-8"?>
+<p:sld xmlns:a="http://schemas.openxmlformats.org/drawingml/2006/main" xmlns:r="http://schemas.openxmlformats.org/officeDocument/2006/relationships" xmlns:p="http://schemas.openxmlformats.org/presentationml/2006/main">
+  <p:cSld>
+    <p:spTree>
+      <p:nvGrpSpPr>
+        <p:cNvPr id="1" name=""/>
+        <p:cNvGrpSpPr/>
+        <p:nvPr/>
+      </p:nvGrpSpPr>
+      <p:grpSpPr>
+        <a:xfrm>
+          <a:off x="0" y="0"/>
+          <a:ext cx="0" cy="0"/>
+          <a:chOff x="0" y="0"/>
+          <a:chExt cx="0" cy="0"/>
+        </a:xfrm>
+      </p:grpSpPr>
+      <p:sp>
+        <p:nvSpPr>
+          <p:cNvPr id="2" name="Title 1">
+            <a:extLst>
+              <a:ext uri="{FF2B5EF4-FFF2-40B4-BE49-F238E27FC236}">
+                <a16:creationId xmlns:a16="http://schemas.microsoft.com/office/drawing/2014/main" id="{A9DF0845-511E-4076-9BEF-9EC12E16C431}"/>
+              </a:ext>
+            </a:extLst>
+          </p:cNvPr>
+          <p:cNvSpPr>
+            <a:spLocks noGrp="1"/>
+          </p:cNvSpPr>
+          <p:nvPr>
+            <p:ph type="title"/>
+          </p:nvPr>
+        </p:nvSpPr>
+        <p:spPr/>
+        <p:txBody>
+          <a:bodyPr/>
+          <a:lstStyle/>
+          <a:p>
+            <a:r>
+              <a:rPr lang="en-US" dirty="0"/>
+              <a:t>Nuclear Reactions</a:t>
+            </a:r>
+          </a:p>
+        </p:txBody>
+      </p:sp>
+      <mc:AlternateContent xmlns:mc="http://schemas.openxmlformats.org/markup-compatibility/2006">
+        <mc:Choice xmlns:a14="http://schemas.microsoft.com/office/drawing/2010/main" Requires="a14">
+          <p:sp>
+            <p:nvSpPr>
+              <p:cNvPr id="3" name="Content Placeholder 2">
+                <a:extLst>
+                  <a:ext uri="{FF2B5EF4-FFF2-40B4-BE49-F238E27FC236}">
+                    <a16:creationId xmlns:a16="http://schemas.microsoft.com/office/drawing/2014/main" id="{CCBAAB87-E711-4CFC-99E2-A8B91788BA2C}"/>
+                  </a:ext>
+                </a:extLst>
+              </p:cNvPr>
+              <p:cNvSpPr>
+                <a:spLocks noGrp="1"/>
+              </p:cNvSpPr>
+              <p:nvPr>
+                <p:ph idx="1"/>
+              </p:nvPr>
+            </p:nvSpPr>
+            <p:spPr/>
+            <p:txBody>
+              <a:bodyPr>
+                <a:normAutofit lnSpcReduction="10000"/>
+              </a:bodyPr>
+              <a:lstStyle/>
+              <a:p>
+                <a:r>
+                  <a:rPr lang="en-US" dirty="0"/>
+                  <a:t>Example: We start with </a:t>
+                </a:r>
+                <a14:m>
+                  <m:oMath xmlns:m="http://schemas.openxmlformats.org/officeDocument/2006/math">
+                    <m:sPre>
+                      <m:sPrePr>
+                        <m:ctrlPr>
+                          <a:rPr lang="en-US" i="1" smtClean="0">
+                            <a:latin typeface="Cambria Math" panose="02040503050406030204" pitchFamily="18" charset="0"/>
+                          </a:rPr>
+                        </m:ctrlPr>
+                      </m:sPrePr>
+                      <m:sub>
+                        <m:r>
+                          <a:rPr lang="en-US" b="0" i="1" smtClean="0">
+                            <a:latin typeface="Cambria Math" panose="02040503050406030204" pitchFamily="18" charset="0"/>
+                          </a:rPr>
+                          <m:t>79</m:t>
+                        </m:r>
+                      </m:sub>
+                      <m:sup>
+                        <m:r>
+                          <a:rPr lang="en-US" b="0" i="1" smtClean="0">
+                            <a:latin typeface="Cambria Math" panose="02040503050406030204" pitchFamily="18" charset="0"/>
+                          </a:rPr>
+                          <m:t>197</m:t>
+                        </m:r>
+                      </m:sup>
+                      <m:e>
+                        <m:r>
+                          <m:rPr>
+                            <m:sty m:val="p"/>
+                          </m:rPr>
+                          <a:rPr lang="en-US" b="0" i="0" smtClean="0">
+                            <a:latin typeface="Cambria Math" panose="02040503050406030204" pitchFamily="18" charset="0"/>
+                          </a:rPr>
+                          <m:t>Au</m:t>
+                        </m:r>
+                      </m:e>
+                    </m:sPre>
+                  </m:oMath>
+                </a14:m>
+                <a:endParaRPr lang="en-US" dirty="0"/>
+              </a:p>
+              <a:p>
+                <a:r>
+                  <a:rPr lang="en-US" dirty="0"/>
+                  <a:t>This is normal, stable gold</a:t>
+                </a:r>
+              </a:p>
+              <a:p>
+                <a:r>
+                  <a:rPr lang="en-US" dirty="0"/>
+                  <a:t>Then we fire a neutron at it!</a:t>
+                </a:r>
+              </a:p>
+              <a:p>
+                <a:r>
+                  <a:rPr lang="en-US" dirty="0"/>
+                  <a:t>Suppose the neutron get captured by the </a:t>
+                </a:r>
+                <a14:m>
+                  <m:oMath xmlns:m="http://schemas.openxmlformats.org/officeDocument/2006/math">
+                    <m:sPre>
+                      <m:sPrePr>
+                        <m:ctrlPr>
+                          <a:rPr lang="en-US" i="1">
+                            <a:latin typeface="Cambria Math" panose="02040503050406030204" pitchFamily="18" charset="0"/>
+                          </a:rPr>
+                        </m:ctrlPr>
+                      </m:sPrePr>
+                      <m:sub>
+                        <m:r>
+                          <a:rPr lang="en-US" i="1">
+                            <a:latin typeface="Cambria Math" panose="02040503050406030204" pitchFamily="18" charset="0"/>
+                          </a:rPr>
+                          <m:t>79</m:t>
+                        </m:r>
+                      </m:sub>
+                      <m:sup>
+                        <m:r>
+                          <a:rPr lang="en-US" i="1">
+                            <a:latin typeface="Cambria Math" panose="02040503050406030204" pitchFamily="18" charset="0"/>
+                          </a:rPr>
+                          <m:t>197</m:t>
+                        </m:r>
+                      </m:sup>
+                      <m:e>
+                        <m:r>
+                          <m:rPr>
+                            <m:sty m:val="p"/>
+                          </m:rPr>
+                          <a:rPr lang="en-US">
+                            <a:latin typeface="Cambria Math" panose="02040503050406030204" pitchFamily="18" charset="0"/>
+                          </a:rPr>
+                          <m:t>Au</m:t>
+                        </m:r>
+                      </m:e>
+                    </m:sPre>
+                  </m:oMath>
+                </a14:m>
+                <a:r>
+                  <a:rPr lang="en-US" dirty="0"/>
+                  <a:t> nucleus</a:t>
+                </a:r>
+              </a:p>
+              <a:p>
+                <a:pPr lvl="1"/>
+                <a:r>
+                  <a:rPr lang="en-US" dirty="0"/>
+                  <a:t>The probability of this depends on the </a:t>
+                </a:r>
+                <a:r>
+                  <a:rPr lang="en-US" i="1" dirty="0"/>
+                  <a:t>neutron cross section</a:t>
+                </a:r>
+                <a:r>
+                  <a:rPr lang="en-US" dirty="0"/>
+                  <a:t> </a:t>
+                </a:r>
+              </a:p>
+              <a:p>
+                <a:pPr lvl="1"/>
+                <a:r>
+                  <a:rPr lang="en-US" dirty="0"/>
+                  <a:t>(Roughly, how big the nucleus “looks” to the neutron)</a:t>
+                </a:r>
+              </a:p>
+            </p:txBody>
+          </p:sp>
+        </mc:Choice>
+        <mc:Fallback>
+          <p:sp>
+            <p:nvSpPr>
+              <p:cNvPr id="3" name="Content Placeholder 2">
+                <a:extLst>
+                  <a:ext uri="{FF2B5EF4-FFF2-40B4-BE49-F238E27FC236}">
+                    <a16:creationId xmlns:a16="http://schemas.microsoft.com/office/drawing/2014/main" id="{CCBAAB87-E711-4CFC-99E2-A8B91788BA2C}"/>
+                  </a:ext>
+                </a:extLst>
+              </p:cNvPr>
+              <p:cNvSpPr>
+                <a:spLocks noGrp="1" noRot="1" noChangeAspect="1" noMove="1" noResize="1" noEditPoints="1" noAdjustHandles="1" noChangeArrowheads="1" noChangeShapeType="1" noTextEdit="1"/>
+              </p:cNvSpPr>
+              <p:nvPr>
+                <p:ph idx="1"/>
+              </p:nvPr>
+            </p:nvSpPr>
+            <p:spPr>
+              <a:blipFill>
+                <a:blip r:embed="rId2"/>
+                <a:stretch>
+                  <a:fillRect l="-1704" t="-2426"/>
+                </a:stretch>
+              </a:blipFill>
+            </p:spPr>
+            <p:txBody>
+              <a:bodyPr/>
+              <a:lstStyle/>
+              <a:p>
+                <a:r>
+                  <a:rPr lang="en-US">
+                    <a:noFill/>
+                  </a:rPr>
+                  <a:t> </a:t>
+                </a:r>
+              </a:p>
+            </p:txBody>
+          </p:sp>
+        </mc:Fallback>
+      </mc:AlternateContent>
+    </p:spTree>
+    <p:extLst>
+      <p:ext uri="{BB962C8B-B14F-4D97-AF65-F5344CB8AC3E}">
+        <p14:creationId xmlns:p14="http://schemas.microsoft.com/office/powerpoint/2010/main" val="1514475232"/>
+      </p:ext>
+    </p:extLst>
+  </p:cSld>
+  <p:clrMapOvr>
+    <a:masterClrMapping/>
+  </p:clrMapOvr>
+</p:sld>
+</file>
+
+<file path=ppt/slides/slide19.xml><?xml version="1.0" encoding="utf-8"?>
+<p:sld xmlns:a="http://schemas.openxmlformats.org/drawingml/2006/main" xmlns:r="http://schemas.openxmlformats.org/officeDocument/2006/relationships" xmlns:p="http://schemas.openxmlformats.org/presentationml/2006/main">
+  <p:cSld>
+    <p:spTree>
+      <p:nvGrpSpPr>
+        <p:cNvPr id="1" name=""/>
+        <p:cNvGrpSpPr/>
+        <p:nvPr/>
+      </p:nvGrpSpPr>
+      <p:grpSpPr>
+        <a:xfrm>
+          <a:off x="0" y="0"/>
+          <a:ext cx="0" cy="0"/>
+          <a:chOff x="0" y="0"/>
+          <a:chExt cx="0" cy="0"/>
+        </a:xfrm>
+      </p:grpSpPr>
+      <p:sp>
+        <p:nvSpPr>
+          <p:cNvPr id="2" name="Title 1">
+            <a:extLst>
+              <a:ext uri="{FF2B5EF4-FFF2-40B4-BE49-F238E27FC236}">
+                <a16:creationId xmlns:a16="http://schemas.microsoft.com/office/drawing/2014/main" id="{1CA4F542-E35F-41FC-8869-C5F233AF3C5E}"/>
+              </a:ext>
+            </a:extLst>
+          </p:cNvPr>
+          <p:cNvSpPr>
+            <a:spLocks noGrp="1"/>
+          </p:cNvSpPr>
+          <p:nvPr>
+            <p:ph type="title"/>
+          </p:nvPr>
+        </p:nvSpPr>
+        <p:spPr/>
+        <p:txBody>
+          <a:bodyPr/>
+          <a:lstStyle/>
+          <a:p>
+            <a:r>
+              <a:rPr lang="en-US" dirty="0"/>
+              <a:t>Nuclear Reactions</a:t>
+            </a:r>
+          </a:p>
+        </p:txBody>
+      </p:sp>
+      <mc:AlternateContent xmlns:mc="http://schemas.openxmlformats.org/markup-compatibility/2006">
+        <mc:Choice xmlns:a14="http://schemas.microsoft.com/office/drawing/2010/main" Requires="a14">
+          <p:sp>
+            <p:nvSpPr>
+              <p:cNvPr id="3" name="Content Placeholder 2">
+                <a:extLst>
+                  <a:ext uri="{FF2B5EF4-FFF2-40B4-BE49-F238E27FC236}">
+                    <a16:creationId xmlns:a16="http://schemas.microsoft.com/office/drawing/2014/main" id="{9C8CCFC7-CCE1-4C93-9103-EEF4049AB417}"/>
+                  </a:ext>
+                </a:extLst>
+              </p:cNvPr>
+              <p:cNvSpPr>
+                <a:spLocks noGrp="1"/>
+              </p:cNvSpPr>
+              <p:nvPr>
+                <p:ph idx="1"/>
+              </p:nvPr>
+            </p:nvSpPr>
+            <p:spPr/>
+            <p:txBody>
+              <a:bodyPr/>
+              <a:lstStyle/>
+              <a:p>
+                <a:r>
+                  <a:rPr lang="en-US" dirty="0"/>
+                  <a:t>We have now produced </a:t>
+                </a:r>
+                <a14:m>
+                  <m:oMath xmlns:m="http://schemas.openxmlformats.org/officeDocument/2006/math">
+                    <m:sPre>
+                      <m:sPrePr>
+                        <m:ctrlPr>
+                          <a:rPr lang="en-US" i="1">
+                            <a:latin typeface="Cambria Math" panose="02040503050406030204" pitchFamily="18" charset="0"/>
+                          </a:rPr>
+                        </m:ctrlPr>
+                      </m:sPrePr>
+                      <m:sub>
+                        <m:r>
+                          <a:rPr lang="en-US" i="1">
+                            <a:latin typeface="Cambria Math" panose="02040503050406030204" pitchFamily="18" charset="0"/>
+                          </a:rPr>
+                          <m:t>79</m:t>
+                        </m:r>
+                      </m:sub>
+                      <m:sup>
+                        <m:r>
+                          <a:rPr lang="en-US" i="1">
+                            <a:latin typeface="Cambria Math" panose="02040503050406030204" pitchFamily="18" charset="0"/>
+                          </a:rPr>
+                          <m:t>19</m:t>
+                        </m:r>
+                        <m:r>
+                          <a:rPr lang="en-US" b="0" i="1" smtClean="0">
+                            <a:latin typeface="Cambria Math" panose="02040503050406030204" pitchFamily="18" charset="0"/>
+                          </a:rPr>
+                          <m:t>8</m:t>
+                        </m:r>
+                      </m:sup>
+                      <m:e>
+                        <m:r>
+                          <m:rPr>
+                            <m:sty m:val="p"/>
+                          </m:rPr>
+                          <a:rPr lang="en-US">
+                            <a:latin typeface="Cambria Math" panose="02040503050406030204" pitchFamily="18" charset="0"/>
+                          </a:rPr>
+                          <m:t>Au</m:t>
+                        </m:r>
+                      </m:e>
+                    </m:sPre>
+                  </m:oMath>
+                </a14:m>
+                <a:r>
+                  <a:rPr lang="en-US" dirty="0"/>
+                  <a:t>!</a:t>
+                </a:r>
+              </a:p>
+              <a:p>
+                <a:pPr lvl="1"/>
+                <a14:m>
+                  <m:oMath xmlns:m="http://schemas.openxmlformats.org/officeDocument/2006/math">
+                    <m:sPre>
+                      <m:sPrePr>
+                        <m:ctrlPr>
+                          <a:rPr lang="en-US" i="1" smtClean="0">
+                            <a:latin typeface="Cambria Math" panose="02040503050406030204" pitchFamily="18" charset="0"/>
+                          </a:rPr>
+                        </m:ctrlPr>
+                      </m:sPrePr>
+                      <m:sub>
+                        <m:r>
+                          <a:rPr lang="en-US" i="1">
+                            <a:latin typeface="Cambria Math" panose="02040503050406030204" pitchFamily="18" charset="0"/>
+                          </a:rPr>
+                          <m:t>79</m:t>
+                        </m:r>
+                      </m:sub>
+                      <m:sup>
+                        <m:r>
+                          <a:rPr lang="en-US" i="1">
+                            <a:latin typeface="Cambria Math" panose="02040503050406030204" pitchFamily="18" charset="0"/>
+                          </a:rPr>
+                          <m:t>197</m:t>
+                        </m:r>
+                      </m:sup>
+                      <m:e>
+                        <m:r>
+                          <m:rPr>
+                            <m:sty m:val="p"/>
+                          </m:rPr>
+                          <a:rPr lang="en-US">
+                            <a:latin typeface="Cambria Math" panose="02040503050406030204" pitchFamily="18" charset="0"/>
+                          </a:rPr>
+                          <m:t>A</m:t>
+                        </m:r>
+                        <m:r>
+                          <m:rPr>
+                            <m:sty m:val="p"/>
+                          </m:rPr>
+                          <a:rPr lang="en-US" b="0" i="0" smtClean="0">
+                            <a:latin typeface="Cambria Math" panose="02040503050406030204" pitchFamily="18" charset="0"/>
+                          </a:rPr>
+                          <m:t>u</m:t>
+                        </m:r>
+                      </m:e>
+                    </m:sPre>
+                    <m:r>
+                      <a:rPr lang="en-US" b="0" i="1" smtClean="0">
+                        <a:latin typeface="Cambria Math" panose="02040503050406030204" pitchFamily="18" charset="0"/>
+                      </a:rPr>
+                      <m:t>+</m:t>
+                    </m:r>
+                    <m:sPre>
+                      <m:sPrePr>
+                        <m:ctrlPr>
+                          <a:rPr lang="en-US" b="0" i="1" smtClean="0">
+                            <a:latin typeface="Cambria Math" panose="02040503050406030204" pitchFamily="18" charset="0"/>
+                          </a:rPr>
+                        </m:ctrlPr>
+                      </m:sPrePr>
+                      <m:sub>
+                        <m:r>
+                          <a:rPr lang="en-US" b="0" i="1" smtClean="0">
+                            <a:latin typeface="Cambria Math" panose="02040503050406030204" pitchFamily="18" charset="0"/>
+                          </a:rPr>
+                          <m:t>0</m:t>
+                        </m:r>
+                      </m:sub>
+                      <m:sup>
+                        <m:r>
+                          <a:rPr lang="en-US" b="0" i="1" smtClean="0">
+                            <a:latin typeface="Cambria Math" panose="02040503050406030204" pitchFamily="18" charset="0"/>
+                          </a:rPr>
+                          <m:t>1</m:t>
+                        </m:r>
+                      </m:sup>
+                      <m:e>
+                        <m:r>
+                          <m:rPr>
+                            <m:sty m:val="p"/>
+                          </m:rPr>
+                          <a:rPr lang="en-US" b="0" i="0" smtClean="0">
+                            <a:latin typeface="Cambria Math" panose="02040503050406030204" pitchFamily="18" charset="0"/>
+                          </a:rPr>
+                          <m:t>n</m:t>
+                        </m:r>
+                      </m:e>
+                    </m:sPre>
+                    <m:r>
+                      <a:rPr lang="en-US" b="0" i="1" smtClean="0">
+                        <a:latin typeface="Cambria Math" panose="02040503050406030204" pitchFamily="18" charset="0"/>
+                        <a:ea typeface="Cambria Math" panose="02040503050406030204" pitchFamily="18" charset="0"/>
+                      </a:rPr>
+                      <m:t>→</m:t>
+                    </m:r>
+                    <m:sPre>
+                      <m:sPrePr>
+                        <m:ctrlPr>
+                          <a:rPr lang="en-US" b="0" i="1" smtClean="0">
+                            <a:latin typeface="Cambria Math" panose="02040503050406030204" pitchFamily="18" charset="0"/>
+                            <a:ea typeface="Cambria Math" panose="02040503050406030204" pitchFamily="18" charset="0"/>
+                          </a:rPr>
+                        </m:ctrlPr>
+                      </m:sPrePr>
+                      <m:sub>
+                        <m:r>
+                          <a:rPr lang="en-US" b="0" i="1" smtClean="0">
+                            <a:latin typeface="Cambria Math" panose="02040503050406030204" pitchFamily="18" charset="0"/>
+                            <a:ea typeface="Cambria Math" panose="02040503050406030204" pitchFamily="18" charset="0"/>
+                          </a:rPr>
+                          <m:t>79</m:t>
+                        </m:r>
+                      </m:sub>
+                      <m:sup>
+                        <m:r>
+                          <a:rPr lang="en-US" b="0" i="1" smtClean="0">
+                            <a:latin typeface="Cambria Math" panose="02040503050406030204" pitchFamily="18" charset="0"/>
+                            <a:ea typeface="Cambria Math" panose="02040503050406030204" pitchFamily="18" charset="0"/>
+                          </a:rPr>
+                          <m:t>198</m:t>
+                        </m:r>
+                      </m:sup>
+                      <m:e>
+                        <m:r>
+                          <m:rPr>
+                            <m:sty m:val="p"/>
+                          </m:rPr>
+                          <a:rPr lang="en-US" b="0" i="0" smtClean="0">
+                            <a:latin typeface="Cambria Math" panose="02040503050406030204" pitchFamily="18" charset="0"/>
+                            <a:ea typeface="Cambria Math" panose="02040503050406030204" pitchFamily="18" charset="0"/>
+                          </a:rPr>
+                          <m:t>Au</m:t>
+                        </m:r>
+                      </m:e>
+                    </m:sPre>
+                    <m:r>
+                      <a:rPr lang="en-US" b="0" i="1" smtClean="0">
+                        <a:latin typeface="Cambria Math" panose="02040503050406030204" pitchFamily="18" charset="0"/>
+                        <a:ea typeface="Cambria Math" panose="02040503050406030204" pitchFamily="18" charset="0"/>
+                      </a:rPr>
+                      <m:t>+ </m:t>
+                    </m:r>
+                    <m:r>
+                      <m:rPr>
+                        <m:sty m:val="p"/>
+                      </m:rPr>
+                      <a:rPr lang="el-GR" b="0" i="1" smtClean="0">
+                        <a:latin typeface="Cambria Math" panose="02040503050406030204" pitchFamily="18" charset="0"/>
+                        <a:ea typeface="Cambria Math" panose="02040503050406030204" pitchFamily="18" charset="0"/>
+                      </a:rPr>
+                      <m:t>γ</m:t>
+                    </m:r>
+                  </m:oMath>
+                </a14:m>
+                <a:endParaRPr lang="en-US" dirty="0"/>
+              </a:p>
+              <a:p>
+                <a:r>
+                  <a:rPr lang="en-US" dirty="0"/>
+                  <a:t>This is an </a:t>
+                </a:r>
+                <a:r>
+                  <a:rPr lang="en-US" u="sng" dirty="0"/>
+                  <a:t>unstable</a:t>
+                </a:r>
+                <a:r>
+                  <a:rPr lang="en-US" dirty="0"/>
+                  <a:t> isotope of gold</a:t>
+                </a:r>
+              </a:p>
+            </p:txBody>
+          </p:sp>
+        </mc:Choice>
+        <mc:Fallback>
+          <p:sp>
+            <p:nvSpPr>
+              <p:cNvPr id="3" name="Content Placeholder 2">
+                <a:extLst>
+                  <a:ext uri="{FF2B5EF4-FFF2-40B4-BE49-F238E27FC236}">
+                    <a16:creationId xmlns:a16="http://schemas.microsoft.com/office/drawing/2014/main" id="{9C8CCFC7-CCE1-4C93-9103-EEF4049AB417}"/>
+                  </a:ext>
+                </a:extLst>
+              </p:cNvPr>
+              <p:cNvSpPr>
+                <a:spLocks noGrp="1" noRot="1" noChangeAspect="1" noMove="1" noResize="1" noEditPoints="1" noAdjustHandles="1" noChangeArrowheads="1" noChangeShapeType="1" noTextEdit="1"/>
+              </p:cNvSpPr>
+              <p:nvPr>
+                <p:ph idx="1"/>
+              </p:nvPr>
+            </p:nvSpPr>
+            <p:spPr>
+              <a:blipFill>
+                <a:blip r:embed="rId2"/>
+                <a:stretch>
+                  <a:fillRect l="-1704" t="-1348"/>
+                </a:stretch>
+              </a:blipFill>
+            </p:spPr>
+            <p:txBody>
+              <a:bodyPr/>
+              <a:lstStyle/>
+              <a:p>
+                <a:r>
+                  <a:rPr lang="en-US">
+                    <a:noFill/>
+                  </a:rPr>
+                  <a:t> </a:t>
+                </a:r>
+              </a:p>
+            </p:txBody>
+          </p:sp>
+        </mc:Fallback>
+      </mc:AlternateContent>
+    </p:spTree>
+    <p:extLst>
+      <p:ext uri="{BB962C8B-B14F-4D97-AF65-F5344CB8AC3E}">
+        <p14:creationId xmlns:p14="http://schemas.microsoft.com/office/powerpoint/2010/main" val="4003220680"/>
+      </p:ext>
+    </p:extLst>
+  </p:cSld>
+  <p:clrMapOvr>
+    <a:masterClrMapping/>
+  </p:clrMapOvr>
+</p:sld>
+</file>
+
 <file path=ppt/slides/slide2.xml><?xml version="1.0" encoding="utf-8"?>
 <p:sld xmlns:a="http://schemas.openxmlformats.org/drawingml/2006/main" xmlns:r="http://schemas.openxmlformats.org/officeDocument/2006/relationships" xmlns:p="http://schemas.openxmlformats.org/presentationml/2006/main">
   <p:cSld>
@@ -5754,6 +6570,397 @@
 </p:sld>
 </file>
 
+<file path=ppt/slides/slide20.xml><?xml version="1.0" encoding="utf-8"?>
+<p:sld xmlns:a="http://schemas.openxmlformats.org/drawingml/2006/main" xmlns:r="http://schemas.openxmlformats.org/officeDocument/2006/relationships" xmlns:p="http://schemas.openxmlformats.org/presentationml/2006/main">
+  <p:cSld>
+    <p:spTree>
+      <p:nvGrpSpPr>
+        <p:cNvPr id="1" name=""/>
+        <p:cNvGrpSpPr/>
+        <p:nvPr/>
+      </p:nvGrpSpPr>
+      <p:grpSpPr>
+        <a:xfrm>
+          <a:off x="0" y="0"/>
+          <a:ext cx="0" cy="0"/>
+          <a:chOff x="0" y="0"/>
+          <a:chExt cx="0" cy="0"/>
+        </a:xfrm>
+      </p:grpSpPr>
+      <p:sp>
+        <p:nvSpPr>
+          <p:cNvPr id="4" name="Rectangle 3">
+            <a:extLst>
+              <a:ext uri="{FF2B5EF4-FFF2-40B4-BE49-F238E27FC236}">
+                <a16:creationId xmlns:a16="http://schemas.microsoft.com/office/drawing/2014/main" id="{4DAD7CA7-5A3E-4C23-82DB-7FAC210A45DE}"/>
+              </a:ext>
+            </a:extLst>
+          </p:cNvPr>
+          <p:cNvSpPr/>
+          <p:nvPr/>
+        </p:nvSpPr>
+        <p:spPr>
+          <a:xfrm>
+            <a:off x="1143000" y="1417638"/>
+            <a:ext cx="6967728" cy="5019738"/>
+          </a:xfrm>
+          <a:prstGeom prst="rect">
+            <a:avLst/>
+          </a:prstGeom>
+          <a:solidFill>
+            <a:schemeClr val="bg1"/>
+          </a:solidFill>
+          <a:ln>
+            <a:noFill/>
+          </a:ln>
+        </p:spPr>
+        <p:style>
+          <a:lnRef idx="2">
+            <a:schemeClr val="accent1">
+              <a:shade val="50000"/>
+            </a:schemeClr>
+          </a:lnRef>
+          <a:fillRef idx="1">
+            <a:schemeClr val="accent1"/>
+          </a:fillRef>
+          <a:effectRef idx="0">
+            <a:schemeClr val="accent1"/>
+          </a:effectRef>
+          <a:fontRef idx="minor">
+            <a:schemeClr val="lt1"/>
+          </a:fontRef>
+        </p:style>
+        <p:txBody>
+          <a:bodyPr rtlCol="0" anchor="ctr"/>
+          <a:lstStyle/>
+          <a:p>
+            <a:pPr algn="ctr"/>
+            <a:endParaRPr lang="en-US"/>
+          </a:p>
+        </p:txBody>
+      </p:sp>
+      <p:sp>
+        <p:nvSpPr>
+          <p:cNvPr id="2" name="Title 1">
+            <a:extLst>
+              <a:ext uri="{FF2B5EF4-FFF2-40B4-BE49-F238E27FC236}">
+                <a16:creationId xmlns:a16="http://schemas.microsoft.com/office/drawing/2014/main" id="{6B57209C-B810-492E-9482-C23F26381889}"/>
+              </a:ext>
+            </a:extLst>
+          </p:cNvPr>
+          <p:cNvSpPr>
+            <a:spLocks noGrp="1"/>
+          </p:cNvSpPr>
+          <p:nvPr>
+            <p:ph type="title"/>
+          </p:nvPr>
+        </p:nvSpPr>
+        <p:spPr/>
+        <p:txBody>
+          <a:bodyPr/>
+          <a:lstStyle/>
+          <a:p>
+            <a:r>
+              <a:rPr lang="en-US" dirty="0"/>
+              <a:t>Nuclear Reactions</a:t>
+            </a:r>
+          </a:p>
+        </p:txBody>
+      </p:sp>
+      <p:pic>
+        <p:nvPicPr>
+          <p:cNvPr id="1026" name="Picture 2">
+            <a:extLst>
+              <a:ext uri="{FF2B5EF4-FFF2-40B4-BE49-F238E27FC236}">
+                <a16:creationId xmlns:a16="http://schemas.microsoft.com/office/drawing/2014/main" id="{83ECB3E5-4493-49A2-9B58-FE2F2D319A6A}"/>
+              </a:ext>
+            </a:extLst>
+          </p:cNvPr>
+          <p:cNvPicPr>
+            <a:picLocks noGrp="1" noChangeAspect="1" noChangeArrowheads="1"/>
+          </p:cNvPicPr>
+          <p:nvPr>
+            <p:ph idx="1"/>
+          </p:nvPr>
+        </p:nvPicPr>
+        <p:blipFill>
+          <a:blip r:embed="rId2">
+            <a:extLst>
+              <a:ext uri="{28A0092B-C50C-407E-A947-70E740481C1C}">
+                <a14:useLocalDpi xmlns:a14="http://schemas.microsoft.com/office/drawing/2010/main" val="0"/>
+              </a:ext>
+            </a:extLst>
+          </a:blip>
+          <a:srcRect/>
+          <a:stretch>
+            <a:fillRect/>
+          </a:stretch>
+        </p:blipFill>
+        <p:spPr bwMode="auto">
+          <a:xfrm>
+            <a:off x="1371319" y="1600200"/>
+            <a:ext cx="6401362" cy="4525963"/>
+          </a:xfrm>
+          <a:prstGeom prst="rect">
+            <a:avLst/>
+          </a:prstGeom>
+          <a:noFill/>
+          <a:extLst>
+            <a:ext uri="{909E8E84-426E-40DD-AFC4-6F175D3DCCD1}">
+              <a14:hiddenFill xmlns:a14="http://schemas.microsoft.com/office/drawing/2010/main">
+                <a:solidFill>
+                  <a:srgbClr val="FFFFFF"/>
+                </a:solidFill>
+              </a14:hiddenFill>
+            </a:ext>
+          </a:extLst>
+        </p:spPr>
+      </p:pic>
+    </p:spTree>
+    <p:extLst>
+      <p:ext uri="{BB962C8B-B14F-4D97-AF65-F5344CB8AC3E}">
+        <p14:creationId xmlns:p14="http://schemas.microsoft.com/office/powerpoint/2010/main" val="139406793"/>
+      </p:ext>
+    </p:extLst>
+  </p:cSld>
+  <p:clrMapOvr>
+    <a:masterClrMapping/>
+  </p:clrMapOvr>
+</p:sld>
+</file>
+
+<file path=ppt/slides/slide21.xml><?xml version="1.0" encoding="utf-8"?>
+<p:sld xmlns:a="http://schemas.openxmlformats.org/drawingml/2006/main" xmlns:r="http://schemas.openxmlformats.org/officeDocument/2006/relationships" xmlns:p="http://schemas.openxmlformats.org/presentationml/2006/main">
+  <p:cSld>
+    <p:spTree>
+      <p:nvGrpSpPr>
+        <p:cNvPr id="1" name=""/>
+        <p:cNvGrpSpPr/>
+        <p:nvPr/>
+      </p:nvGrpSpPr>
+      <p:grpSpPr>
+        <a:xfrm>
+          <a:off x="0" y="0"/>
+          <a:ext cx="0" cy="0"/>
+          <a:chOff x="0" y="0"/>
+          <a:chExt cx="0" cy="0"/>
+        </a:xfrm>
+      </p:grpSpPr>
+      <p:sp>
+        <p:nvSpPr>
+          <p:cNvPr id="2" name="Title 1">
+            <a:extLst>
+              <a:ext uri="{FF2B5EF4-FFF2-40B4-BE49-F238E27FC236}">
+                <a16:creationId xmlns:a16="http://schemas.microsoft.com/office/drawing/2014/main" id="{91EA5691-EAD2-42F3-BB09-D7A1CA7A0634}"/>
+              </a:ext>
+            </a:extLst>
+          </p:cNvPr>
+          <p:cNvSpPr>
+            <a:spLocks noGrp="1"/>
+          </p:cNvSpPr>
+          <p:nvPr>
+            <p:ph type="title"/>
+          </p:nvPr>
+        </p:nvSpPr>
+        <p:spPr/>
+        <p:txBody>
+          <a:bodyPr/>
+          <a:lstStyle/>
+          <a:p>
+            <a:r>
+              <a:rPr lang="en-US" dirty="0"/>
+              <a:t>Nuclear Reactions</a:t>
+            </a:r>
+          </a:p>
+        </p:txBody>
+      </p:sp>
+      <mc:AlternateContent xmlns:mc="http://schemas.openxmlformats.org/markup-compatibility/2006">
+        <mc:Choice xmlns:a14="http://schemas.microsoft.com/office/drawing/2010/main" Requires="a14">
+          <p:sp>
+            <p:nvSpPr>
+              <p:cNvPr id="3" name="Content Placeholder 2">
+                <a:extLst>
+                  <a:ext uri="{FF2B5EF4-FFF2-40B4-BE49-F238E27FC236}">
+                    <a16:creationId xmlns:a16="http://schemas.microsoft.com/office/drawing/2014/main" id="{61D90480-05C8-4E70-90FB-2AEDEDEADF70}"/>
+                  </a:ext>
+                </a:extLst>
+              </p:cNvPr>
+              <p:cNvSpPr>
+                <a:spLocks noGrp="1"/>
+              </p:cNvSpPr>
+              <p:nvPr>
+                <p:ph idx="1"/>
+              </p:nvPr>
+            </p:nvSpPr>
+            <p:spPr/>
+            <p:txBody>
+              <a:bodyPr>
+                <a:normAutofit lnSpcReduction="10000"/>
+              </a:bodyPr>
+              <a:lstStyle/>
+              <a:p>
+                <a:r>
+                  <a:rPr lang="en-US" sz="2400" dirty="0"/>
+                  <a:t>Example: </a:t>
+                </a:r>
+                <a:r>
+                  <a:rPr lang="en-US" sz="2400" dirty="0">
+                    <a:hlinkClick r:id="rId2"/>
+                  </a:rPr>
+                  <a:t>https://www.youtube.com/watch?v=RKyIm-o30GE</a:t>
+                </a:r>
+                <a:endParaRPr lang="en-US" sz="2400" dirty="0"/>
+              </a:p>
+              <a:p>
+                <a:r>
+                  <a:rPr lang="en-US" dirty="0"/>
+                  <a:t>This is </a:t>
+                </a:r>
+                <a:r>
+                  <a:rPr lang="en-US" i="1" dirty="0"/>
+                  <a:t>extremely powerful</a:t>
+                </a:r>
+              </a:p>
+              <a:p>
+                <a:r>
+                  <a:rPr lang="en-US" dirty="0"/>
+                  <a:t>Through the use of neutrons, we have:</a:t>
+                </a:r>
+              </a:p>
+              <a:p>
+                <a:pPr lvl="1"/>
+                <a:r>
+                  <a:rPr lang="en-US" dirty="0"/>
+                  <a:t>Turned stable gold into radioactive gold</a:t>
+                </a:r>
+              </a:p>
+              <a:p>
+                <a:pPr lvl="1"/>
+                <a:r>
+                  <a:rPr lang="en-US" dirty="0"/>
+                  <a:t>Eventually turned gold into an entirely different element </a:t>
+                </a:r>
+                <a14:m>
+                  <m:oMath xmlns:m="http://schemas.openxmlformats.org/officeDocument/2006/math">
+                    <m:d>
+                      <m:dPr>
+                        <m:ctrlPr>
+                          <a:rPr lang="en-US" i="1" smtClean="0">
+                            <a:latin typeface="Cambria Math" panose="02040503050406030204" pitchFamily="18" charset="0"/>
+                          </a:rPr>
+                        </m:ctrlPr>
+                      </m:dPr>
+                      <m:e>
+                        <m:sPre>
+                          <m:sPrePr>
+                            <m:ctrlPr>
+                              <a:rPr lang="en-US" i="1" smtClean="0">
+                                <a:latin typeface="Cambria Math" panose="02040503050406030204" pitchFamily="18" charset="0"/>
+                              </a:rPr>
+                            </m:ctrlPr>
+                          </m:sPrePr>
+                          <m:sub>
+                            <m:r>
+                              <a:rPr lang="en-US" b="0" i="1" smtClean="0">
+                                <a:latin typeface="Cambria Math" panose="02040503050406030204" pitchFamily="18" charset="0"/>
+                              </a:rPr>
+                              <m:t>80</m:t>
+                            </m:r>
+                          </m:sub>
+                          <m:sup>
+                            <m:r>
+                              <a:rPr lang="en-US" b="0" i="1" smtClean="0">
+                                <a:latin typeface="Cambria Math" panose="02040503050406030204" pitchFamily="18" charset="0"/>
+                              </a:rPr>
+                              <m:t>198</m:t>
+                            </m:r>
+                          </m:sup>
+                          <m:e>
+                            <m:r>
+                              <m:rPr>
+                                <m:sty m:val="p"/>
+                              </m:rPr>
+                              <a:rPr lang="en-US" b="0" i="0" smtClean="0">
+                                <a:latin typeface="Cambria Math" panose="02040503050406030204" pitchFamily="18" charset="0"/>
+                              </a:rPr>
+                              <m:t>Hg</m:t>
+                            </m:r>
+                          </m:e>
+                        </m:sPre>
+                      </m:e>
+                    </m:d>
+                  </m:oMath>
+                </a14:m>
+                <a:endParaRPr lang="en-US" dirty="0"/>
+              </a:p>
+              <a:p>
+                <a:r>
+                  <a:rPr lang="en-US" dirty="0"/>
+                  <a:t>You can’t do that in chemistry!</a:t>
+                </a:r>
+              </a:p>
+              <a:p>
+                <a:r>
+                  <a:rPr lang="en-US" b="1" dirty="0"/>
+                  <a:t>Conclusion: in nuclear reactions, neutrons are everything</a:t>
+                </a:r>
+              </a:p>
+            </p:txBody>
+          </p:sp>
+        </mc:Choice>
+        <mc:Fallback>
+          <p:sp>
+            <p:nvSpPr>
+              <p:cNvPr id="3" name="Content Placeholder 2">
+                <a:extLst>
+                  <a:ext uri="{FF2B5EF4-FFF2-40B4-BE49-F238E27FC236}">
+                    <a16:creationId xmlns:a16="http://schemas.microsoft.com/office/drawing/2014/main" id="{61D90480-05C8-4E70-90FB-2AEDEDEADF70}"/>
+                  </a:ext>
+                </a:extLst>
+              </p:cNvPr>
+              <p:cNvSpPr>
+                <a:spLocks noGrp="1" noRot="1" noChangeAspect="1" noMove="1" noResize="1" noEditPoints="1" noAdjustHandles="1" noChangeArrowheads="1" noChangeShapeType="1" noTextEdit="1"/>
+              </p:cNvSpPr>
+              <p:nvPr>
+                <p:ph idx="1"/>
+              </p:nvPr>
+            </p:nvSpPr>
+            <p:spPr>
+              <a:blipFill>
+                <a:blip r:embed="rId3"/>
+                <a:stretch>
+                  <a:fillRect l="-1704" t="-1887" b="-270"/>
+                </a:stretch>
+              </a:blipFill>
+            </p:spPr>
+            <p:txBody>
+              <a:bodyPr/>
+              <a:lstStyle/>
+              <a:p>
+                <a:r>
+                  <a:rPr lang="en-US">
+                    <a:noFill/>
+                  </a:rPr>
+                  <a:t> </a:t>
+                </a:r>
+              </a:p>
+            </p:txBody>
+          </p:sp>
+        </mc:Fallback>
+      </mc:AlternateContent>
+    </p:spTree>
+    <p:extLst>
+      <p:ext uri="{BB962C8B-B14F-4D97-AF65-F5344CB8AC3E}">
+        <p14:creationId xmlns:p14="http://schemas.microsoft.com/office/powerpoint/2010/main" val="573034447"/>
+      </p:ext>
+    </p:extLst>
+  </p:cSld>
+  <p:clrMapOvr>
+    <a:masterClrMapping/>
+  </p:clrMapOvr>
+</p:sld>
+</file>
+
 <file path=ppt/slides/slide3.xml><?xml version="1.0" encoding="utf-8"?>
 <p:sld xmlns:a="http://schemas.openxmlformats.org/drawingml/2006/main" xmlns:r="http://schemas.openxmlformats.org/officeDocument/2006/relationships" xmlns:p="http://schemas.openxmlformats.org/presentationml/2006/main">
   <p:cSld>
@@ -5807,8 +7014,8 @@
           </a:p>
         </p:txBody>
       </p:sp>
-      <mc:AlternateContent xmlns:mc="http://schemas.openxmlformats.org/markup-compatibility/2006">
-        <mc:Choice xmlns:a14="http://schemas.microsoft.com/office/drawing/2010/main" Requires="a14">
+      <mc:AlternateContent xmlns:mc="http://schemas.openxmlformats.org/markup-compatibility/2006" xmlns:a14="http://schemas.microsoft.com/office/drawing/2010/main">
+        <mc:Choice Requires="a14">
           <p:sp>
             <p:nvSpPr>
               <p:cNvPr id="4" name="Content Placeholder 3">
@@ -6088,7 +7295,7 @@
             </p:txBody>
           </p:sp>
         </mc:Choice>
-        <mc:Fallback>
+        <mc:Fallback xmlns="">
           <p:sp>
             <p:nvSpPr>
               <p:cNvPr id="4" name="Content Placeholder 3">
@@ -6238,8 +7445,8 @@
           </a:p>
         </p:txBody>
       </p:sp>
-      <mc:AlternateContent xmlns:mc="http://schemas.openxmlformats.org/markup-compatibility/2006">
-        <mc:Choice xmlns:a14="http://schemas.microsoft.com/office/drawing/2010/main" Requires="a14">
+      <mc:AlternateContent xmlns:mc="http://schemas.openxmlformats.org/markup-compatibility/2006" xmlns:a14="http://schemas.microsoft.com/office/drawing/2010/main">
+        <mc:Choice Requires="a14">
           <p:sp>
             <p:nvSpPr>
               <p:cNvPr id="4" name="Content Placeholder 3">
@@ -6345,7 +7552,7 @@
             </p:txBody>
           </p:sp>
         </mc:Choice>
-        <mc:Fallback>
+        <mc:Fallback xmlns="">
           <p:sp>
             <p:nvSpPr>
               <p:cNvPr id="4" name="Content Placeholder 3">
@@ -22419,8 +23626,8 @@
           </a:p>
         </p:txBody>
       </p:sp>
-      <mc:AlternateContent xmlns:mc="http://schemas.openxmlformats.org/markup-compatibility/2006">
-        <mc:Choice xmlns:a14="http://schemas.microsoft.com/office/drawing/2010/main" Requires="a14">
+      <mc:AlternateContent xmlns:mc="http://schemas.openxmlformats.org/markup-compatibility/2006" xmlns:a14="http://schemas.microsoft.com/office/drawing/2010/main">
+        <mc:Choice Requires="a14">
           <p:sp>
             <p:nvSpPr>
               <p:cNvPr id="3" name="Content Placeholder 2">
@@ -22631,7 +23838,7 @@
             </p:txBody>
           </p:sp>
         </mc:Choice>
-        <mc:Fallback>
+        <mc:Fallback xmlns="">
           <p:sp>
             <p:nvSpPr>
               <p:cNvPr id="3" name="Content Placeholder 2">
@@ -22759,8 +23966,8 @@
           </a:p>
         </p:txBody>
       </p:sp>
-      <mc:AlternateContent xmlns:mc="http://schemas.openxmlformats.org/markup-compatibility/2006">
-        <mc:Choice xmlns:a14="http://schemas.microsoft.com/office/drawing/2010/main" Requires="a14">
+      <mc:AlternateContent xmlns:mc="http://schemas.openxmlformats.org/markup-compatibility/2006" xmlns:a14="http://schemas.microsoft.com/office/drawing/2010/main">
+        <mc:Choice Requires="a14">
           <p:sp>
             <p:nvSpPr>
               <p:cNvPr id="3" name="Content Placeholder 2">
@@ -22867,7 +24074,7 @@
             </p:txBody>
           </p:sp>
         </mc:Choice>
-        <mc:Fallback>
+        <mc:Fallback xmlns="">
           <p:sp>
             <p:nvSpPr>
               <p:cNvPr id="3" name="Content Placeholder 2">

</xml_diff>